<commit_message>
Update tests to improve coverage
</commit_message>
<xml_diff>
--- a/inst/extdata/template_fullslide_half.pptx
+++ b/inst/extdata/template_fullslide_half.pptx
@@ -2605,7 +2605,7 @@
         <p:spPr>
           <a:xfrm>
             <a:off x="371475" y="6239781"/>
-            <a:ext cx="10662320" cy="455613"/>
+            <a:ext cx="5580000" cy="455613"/>
           </a:xfrm>
         </p:spPr>
         <p:txBody>
@@ -2650,7 +2650,7 @@
         <p:spPr>
           <a:xfrm>
             <a:off x="378478" y="1312069"/>
-            <a:ext cx="11398531" cy="335156"/>
+            <a:ext cx="5572997" cy="335156"/>
           </a:xfrm>
         </p:spPr>
         <p:txBody>

</xml_diff>